<commit_message>
Starts writing chapter 1. Minor changes in code.
</commit_message>
<xml_diff>
--- a/3 Entwicklungsphase/weekly_meeting_15.pptx
+++ b/3 Entwicklungsphase/weekly_meeting_15.pptx
@@ -352,7 +352,7 @@
               <a:rPr lang="en-US" smtClean="0">
                 <a:uFillTx/>
               </a:rPr>
-              <a:t>‹Nr.›</a:t>
+              <a:t>‹#›</a:t>
             </a:fld>
             <a:endParaRPr lang="en-US">
               <a:uFillTx/>
@@ -537,7 +537,7 @@
               <a:rPr lang="en-US" smtClean="0">
                 <a:uFillTx/>
               </a:rPr>
-              <a:t>‹Nr.›</a:t>
+              <a:t>‹#›</a:t>
             </a:fld>
             <a:endParaRPr lang="en-US">
               <a:uFillTx/>
@@ -732,7 +732,7 @@
               <a:rPr lang="en-US" smtClean="0">
                 <a:uFillTx/>
               </a:rPr>
-              <a:t>‹Nr.›</a:t>
+              <a:t>‹#›</a:t>
             </a:fld>
             <a:endParaRPr lang="en-US">
               <a:uFillTx/>
@@ -917,7 +917,7 @@
               <a:rPr lang="en-US" smtClean="0">
                 <a:uFillTx/>
               </a:rPr>
-              <a:t>‹Nr.›</a:t>
+              <a:t>‹#›</a:t>
             </a:fld>
             <a:endParaRPr lang="en-US">
               <a:uFillTx/>
@@ -1182,7 +1182,7 @@
               <a:rPr lang="en-US" smtClean="0">
                 <a:uFillTx/>
               </a:rPr>
-              <a:t>‹Nr.›</a:t>
+              <a:t>‹#›</a:t>
             </a:fld>
             <a:endParaRPr lang="en-US">
               <a:uFillTx/>
@@ -1438,7 +1438,7 @@
               <a:rPr lang="en-US" smtClean="0">
                 <a:uFillTx/>
               </a:rPr>
-              <a:t>‹Nr.›</a:t>
+              <a:t>‹#›</a:t>
             </a:fld>
             <a:endParaRPr lang="en-US">
               <a:uFillTx/>
@@ -1869,7 +1869,7 @@
               <a:rPr lang="en-US" smtClean="0">
                 <a:uFillTx/>
               </a:rPr>
-              <a:t>‹Nr.›</a:t>
+              <a:t>‹#›</a:t>
             </a:fld>
             <a:endParaRPr lang="en-US">
               <a:uFillTx/>
@@ -1993,7 +1993,7 @@
               <a:rPr lang="en-US" smtClean="0">
                 <a:uFillTx/>
               </a:rPr>
-              <a:t>‹Nr.›</a:t>
+              <a:t>‹#›</a:t>
             </a:fld>
             <a:endParaRPr lang="en-US">
               <a:uFillTx/>
@@ -2093,7 +2093,7 @@
               <a:rPr lang="en-US" smtClean="0">
                 <a:uFillTx/>
               </a:rPr>
-              <a:t>‹Nr.›</a:t>
+              <a:t>‹#›</a:t>
             </a:fld>
             <a:endParaRPr lang="en-US">
               <a:uFillTx/>
@@ -2425,7 +2425,7 @@
               <a:rPr lang="en-US" smtClean="0">
                 <a:uFillTx/>
               </a:rPr>
-              <a:t>‹Nr.›</a:t>
+              <a:t>‹#›</a:t>
             </a:fld>
             <a:endParaRPr lang="en-US">
               <a:uFillTx/>
@@ -2726,7 +2726,7 @@
               <a:rPr lang="en-US" smtClean="0">
                 <a:uFillTx/>
               </a:rPr>
-              <a:t>‹Nr.›</a:t>
+              <a:t>‹#›</a:t>
             </a:fld>
             <a:endParaRPr lang="en-US">
               <a:uFillTx/>
@@ -2993,7 +2993,7 @@
               <a:rPr lang="en-US" smtClean="0">
                 <a:uFillTx/>
               </a:rPr>
-              <a:t>‹Nr.›</a:t>
+              <a:t>‹#›</a:t>
             </a:fld>
             <a:endParaRPr lang="en-US">
               <a:uFillTx/>
@@ -3398,7 +3398,7 @@
                 </a:solidFill>
                 <a:uFillTx/>
               </a:rPr>
-              <a:t>Weekly Meeting 14</a:t>
+              <a:t>Weekly Meeting 15</a:t>
             </a:r>
           </a:p>
           <a:p>
@@ -3551,20 +3551,12 @@
           <a:lstStyle/>
           <a:p>
             <a:r>
-              <a:rPr lang="en-GB" sz="3200" b="1" dirty="0" err="1" smtClean="0">
+              <a:rPr lang="en-GB" sz="3200" b="1" dirty="0" err="1">
                 <a:solidFill>
                   <a:srgbClr val="339966"/>
                 </a:solidFill>
               </a:rPr>
               <a:t>visuVertices</a:t>
-            </a:r>
-            <a:r>
-              <a:rPr lang="en-GB" sz="3200" b="1" dirty="0">
-                <a:solidFill>
-                  <a:srgbClr val="339966"/>
-                </a:solidFill>
-              </a:rPr>
-              <a:t/>
             </a:r>
             <a:br>
               <a:rPr lang="en-GB" sz="3200" b="1" dirty="0">
@@ -3861,12 +3853,8 @@
               <a:t> </a:t>
             </a:r>
             <a:r>
-              <a:rPr lang="en-US" sz="2400" dirty="0" smtClean="0"/>
-              <a:t>Query </a:t>
-            </a:r>
-            <a:r>
               <a:rPr lang="en-US" sz="2400" dirty="0"/>
-              <a:t>data for data bindings and animations along with </a:t>
+              <a:t>Query data for data bindings and animations along with </a:t>
             </a:r>
             <a:r>
               <a:rPr lang="en-US" sz="2400" dirty="0" err="1"/>
@@ -3876,34 +3864,33 @@
               <a:rPr lang="en-US" sz="2400" dirty="0"/>
               <a:t>:</a:t>
             </a:r>
-            <a:endParaRPr lang="en-US" sz="2400" dirty="0"/>
-          </a:p>
-          <a:p>
-            <a:endParaRPr lang="en-US" b="1" dirty="0" smtClean="0"/>
           </a:p>
           <a:p>
             <a:endParaRPr lang="en-US" b="1" dirty="0"/>
           </a:p>
           <a:p>
+            <a:endParaRPr lang="en-US" b="1" dirty="0"/>
+          </a:p>
+          <a:p>
             <a:pPr lvl="2"/>
             <a:r>
-              <a:rPr lang="en-US" b="1" dirty="0" smtClean="0"/>
+              <a:rPr lang="en-US" b="1" dirty="0"/>
               <a:t>SELECT</a:t>
             </a:r>
             <a:r>
-              <a:rPr lang="en-US" dirty="0" smtClean="0"/>
+              <a:rPr lang="en-US" dirty="0"/>
               <a:t> * </a:t>
             </a:r>
             <a:r>
-              <a:rPr lang="en-US" b="1" dirty="0" smtClean="0"/>
+              <a:rPr lang="en-US" b="1" dirty="0"/>
               <a:t>FROM</a:t>
             </a:r>
             <a:r>
-              <a:rPr lang="en-US" dirty="0" smtClean="0"/>
+              <a:rPr lang="en-US" dirty="0"/>
               <a:t> </a:t>
             </a:r>
             <a:r>
-              <a:rPr lang="en-US" dirty="0" err="1" smtClean="0"/>
+              <a:rPr lang="en-US" dirty="0" err="1"/>
               <a:t>sapient_owner.prj_prc_visu_vertices</a:t>
             </a:r>
             <a:endParaRPr lang="en-US" dirty="0"/>
@@ -3911,11 +3898,11 @@
           <a:p>
             <a:pPr lvl="2"/>
             <a:r>
-              <a:rPr lang="en-US" b="1" dirty="0" smtClean="0"/>
+              <a:rPr lang="en-US" b="1" dirty="0"/>
               <a:t>[ORDER</a:t>
             </a:r>
             <a:r>
-              <a:rPr lang="en-US" dirty="0" smtClean="0"/>
+              <a:rPr lang="en-US" dirty="0"/>
               <a:t> </a:t>
             </a:r>
             <a:r>
@@ -3924,14 +3911,10 @@
             </a:r>
             <a:r>
               <a:rPr lang="en-US" dirty="0"/>
-              <a:t> </a:t>
-            </a:r>
-            <a:r>
-              <a:rPr lang="en-US" dirty="0" smtClean="0"/>
-              <a:t>id </a:t>
-            </a:r>
-            <a:r>
-              <a:rPr lang="en-US" b="1" dirty="0" smtClean="0"/>
+              <a:t> id </a:t>
+            </a:r>
+            <a:r>
+              <a:rPr lang="en-US" b="1" dirty="0"/>
               <a:t>ASC]</a:t>
             </a:r>
           </a:p>
@@ -3951,15 +3934,15 @@
               <a:t> </a:t>
             </a:r>
             <a:r>
-              <a:rPr lang="en-US" sz="2400" dirty="0" smtClean="0"/>
+              <a:rPr lang="en-US" sz="2400" dirty="0"/>
               <a:t>Then in </a:t>
             </a:r>
             <a:r>
-              <a:rPr lang="en-US" sz="2400" dirty="0" err="1" smtClean="0"/>
+              <a:rPr lang="en-US" sz="2400" dirty="0" err="1"/>
               <a:t>checkIfQueriesDone</a:t>
             </a:r>
             <a:r>
-              <a:rPr lang="en-US" sz="2400" dirty="0" smtClean="0"/>
+              <a:rPr lang="en-US" sz="2400" dirty="0"/>
               <a:t>():</a:t>
             </a:r>
           </a:p>
@@ -3971,7 +3954,7 @@
               <a:buFont typeface="Wingdings" panose="05000000000000000000" pitchFamily="2" charset="2"/>
               <a:buChar char="§"/>
             </a:pPr>
-            <a:endParaRPr lang="en-US" sz="2400" dirty="0" smtClean="0"/>
+            <a:endParaRPr lang="en-US" sz="2400" dirty="0"/>
           </a:p>
           <a:p>
             <a:pPr marL="457200" indent="-457200">
@@ -3982,11 +3965,11 @@
               <a:buAutoNum type="arabicPeriod"/>
             </a:pPr>
             <a:r>
-              <a:rPr lang="en-US" b="1" dirty="0" smtClean="0"/>
+              <a:rPr lang="en-US" b="1" dirty="0"/>
               <a:t>Join</a:t>
             </a:r>
             <a:r>
-              <a:rPr lang="en-US" dirty="0" smtClean="0"/>
+              <a:rPr lang="en-US" dirty="0"/>
               <a:t>:</a:t>
             </a:r>
           </a:p>
@@ -3999,31 +3982,31 @@
               <a:buChar char="•"/>
             </a:pPr>
             <a:r>
-              <a:rPr lang="en-US" dirty="0" smtClean="0"/>
+              <a:rPr lang="en-US" dirty="0"/>
               <a:t>All queried </a:t>
             </a:r>
             <a:r>
-              <a:rPr lang="en-US" dirty="0" err="1" smtClean="0"/>
+              <a:rPr lang="en-US" dirty="0" err="1"/>
               <a:t>lNodes</a:t>
             </a:r>
             <a:r>
-              <a:rPr lang="en-US" dirty="0" smtClean="0"/>
+              <a:rPr lang="en-US" dirty="0"/>
               <a:t> (WHERE id &gt;= </a:t>
             </a:r>
             <a:r>
-              <a:rPr lang="en-US" dirty="0" err="1" smtClean="0"/>
+              <a:rPr lang="en-US" dirty="0" err="1"/>
               <a:t>rootID</a:t>
             </a:r>
             <a:r>
-              <a:rPr lang="en-US" dirty="0" smtClean="0"/>
+              <a:rPr lang="en-US" dirty="0"/>
               <a:t>) and </a:t>
             </a:r>
             <a:r>
-              <a:rPr lang="en-US" dirty="0" err="1" smtClean="0"/>
+              <a:rPr lang="en-US" dirty="0" err="1"/>
               <a:t>visuVertices</a:t>
             </a:r>
             <a:r>
-              <a:rPr lang="en-US" dirty="0" smtClean="0"/>
+              <a:rPr lang="en-US" dirty="0"/>
               <a:t> with JavaScript</a:t>
             </a:r>
           </a:p>
@@ -4036,11 +4019,11 @@
               <a:buAutoNum type="arabicPeriod"/>
             </a:pPr>
             <a:r>
-              <a:rPr lang="en-US" b="1" dirty="0" smtClean="0"/>
+              <a:rPr lang="en-US" b="1" dirty="0"/>
               <a:t>Filter</a:t>
             </a:r>
             <a:r>
-              <a:rPr lang="en-US" dirty="0" smtClean="0"/>
+              <a:rPr lang="en-US" dirty="0"/>
               <a:t>:</a:t>
             </a:r>
           </a:p>
@@ -4053,26 +4036,25 @@
               <a:buChar char="•"/>
             </a:pPr>
             <a:r>
-              <a:rPr lang="en-US" dirty="0" smtClean="0"/>
+              <a:rPr lang="en-US" dirty="0"/>
               <a:t>in </a:t>
             </a:r>
             <a:r>
-              <a:rPr lang="en-US" dirty="0" err="1" smtClean="0"/>
+              <a:rPr lang="en-US" dirty="0" err="1"/>
               <a:t>buildHierarchy</a:t>
             </a:r>
             <a:r>
-              <a:rPr lang="en-US" dirty="0" smtClean="0"/>
+              <a:rPr lang="en-US" dirty="0"/>
               <a:t>() where only descendants of </a:t>
             </a:r>
             <a:r>
-              <a:rPr lang="en-US" dirty="0" err="1" smtClean="0"/>
+              <a:rPr lang="en-US" dirty="0" err="1"/>
               <a:t>selectedRootNode</a:t>
             </a:r>
             <a:r>
-              <a:rPr lang="en-US" dirty="0" smtClean="0"/>
+              <a:rPr lang="en-US" dirty="0"/>
               <a:t> are kept, rest is removed</a:t>
             </a:r>
-            <a:endParaRPr lang="en-US" dirty="0"/>
           </a:p>
           <a:p>
             <a:endParaRPr lang="en-US" b="1" dirty="0"/>
@@ -4132,7 +4114,7 @@
           <a:lstStyle/>
           <a:p>
             <a:r>
-              <a:rPr lang="en-GB" sz="3200" b="1" dirty="0" err="1" smtClean="0">
+              <a:rPr lang="en-GB" sz="3200" b="1" dirty="0" err="1">
                 <a:solidFill>
                   <a:srgbClr val="339966"/>
                 </a:solidFill>
@@ -4141,21 +4123,12 @@
               <a:t>pid</a:t>
             </a:r>
             <a:r>
-              <a:rPr lang="en-GB" sz="3200" b="1" dirty="0" err="1" smtClean="0">
+              <a:rPr lang="en-GB" sz="3200" b="1" dirty="0" err="1">
                 <a:solidFill>
                   <a:srgbClr val="339966"/>
                 </a:solidFill>
               </a:rPr>
               <a:t>Connections</a:t>
-            </a:r>
-            <a:r>
-              <a:rPr lang="en-GB" sz="3200" b="1" dirty="0">
-                <a:solidFill>
-                  <a:srgbClr val="339966"/>
-                </a:solidFill>
-                <a:uFillTx/>
-              </a:rPr>
-              <a:t/>
             </a:r>
             <a:br>
               <a:rPr lang="en-GB" sz="3200" b="1" dirty="0">
@@ -4166,7 +4139,7 @@
               </a:rPr>
             </a:br>
             <a:r>
-              <a:rPr lang="en-GB" sz="1600" b="1" dirty="0" smtClean="0">
+              <a:rPr lang="en-GB" sz="1600" b="1" dirty="0">
                 <a:solidFill>
                   <a:schemeClr val="bg1">
                     <a:lumMod val="50000"/>
@@ -6070,7 +6043,7 @@
           <a:p>
             <a:pPr algn="ctr"/>
             <a:r>
-              <a:rPr lang="de-DE" b="1" dirty="0" err="1" smtClean="0">
+              <a:rPr lang="de-DE" b="1" dirty="0" err="1">
                 <a:solidFill>
                   <a:srgbClr val="FF0000"/>
                 </a:solidFill>
@@ -6078,7 +6051,7 @@
               <a:t>pidConnections</a:t>
             </a:r>
             <a:r>
-              <a:rPr lang="de-DE" b="1" dirty="0" smtClean="0">
+              <a:rPr lang="de-DE" b="1" dirty="0">
                 <a:solidFill>
                   <a:srgbClr val="FF0000"/>
                 </a:solidFill>
@@ -6086,7 +6059,7 @@
               <a:t> </a:t>
             </a:r>
             <a:r>
-              <a:rPr lang="de-DE" b="1" dirty="0" err="1" smtClean="0">
+              <a:rPr lang="de-DE" b="1" dirty="0" err="1">
                 <a:solidFill>
                   <a:srgbClr val="FF0000"/>
                 </a:solidFill>
@@ -6154,20 +6127,12 @@
           <a:lstStyle/>
           <a:p>
             <a:r>
-              <a:rPr lang="en-GB" sz="3200" b="1" dirty="0" err="1" smtClean="0">
+              <a:rPr lang="en-GB" sz="3200" b="1" dirty="0" err="1">
                 <a:solidFill>
                   <a:srgbClr val="339966"/>
                 </a:solidFill>
               </a:rPr>
               <a:t>visuVertices</a:t>
-            </a:r>
-            <a:r>
-              <a:rPr lang="en-GB" sz="3200" b="1" dirty="0">
-                <a:solidFill>
-                  <a:srgbClr val="339966"/>
-                </a:solidFill>
-              </a:rPr>
-              <a:t/>
             </a:r>
             <a:br>
               <a:rPr lang="en-GB" sz="3200" b="1" dirty="0">
@@ -6464,10 +6429,9 @@
               <a:t> </a:t>
             </a:r>
             <a:r>
-              <a:rPr lang="en-US" sz="2400" dirty="0" smtClean="0"/>
+              <a:rPr lang="en-US" sz="2400" dirty="0"/>
               <a:t>Query all flows:</a:t>
             </a:r>
-            <a:endParaRPr lang="en-US" sz="2400" dirty="0"/>
           </a:p>
           <a:p>
             <a:endParaRPr lang="en-US" b="1" dirty="0"/>
@@ -6475,23 +6439,23 @@
           <a:p>
             <a:pPr lvl="2"/>
             <a:r>
-              <a:rPr lang="en-US" b="1" dirty="0" smtClean="0"/>
+              <a:rPr lang="en-US" b="1" dirty="0"/>
               <a:t>SELECT</a:t>
             </a:r>
             <a:r>
-              <a:rPr lang="en-US" dirty="0" smtClean="0"/>
+              <a:rPr lang="en-US" dirty="0"/>
               <a:t> * </a:t>
             </a:r>
             <a:r>
-              <a:rPr lang="en-US" b="1" dirty="0" smtClean="0"/>
+              <a:rPr lang="en-US" b="1" dirty="0"/>
               <a:t>FROM</a:t>
             </a:r>
             <a:r>
-              <a:rPr lang="en-US" dirty="0" smtClean="0"/>
+              <a:rPr lang="en-US" dirty="0"/>
               <a:t> </a:t>
             </a:r>
             <a:r>
-              <a:rPr lang="en-US" dirty="0" err="1" smtClean="0"/>
+              <a:rPr lang="en-US" dirty="0" err="1"/>
               <a:t>sapient_owner.prj_prc_pro_flows</a:t>
             </a:r>
             <a:endParaRPr lang="en-US" dirty="0"/>
@@ -6499,11 +6463,11 @@
           <a:p>
             <a:pPr lvl="2"/>
             <a:r>
-              <a:rPr lang="en-US" b="1" dirty="0" smtClean="0"/>
+              <a:rPr lang="en-US" b="1" dirty="0"/>
               <a:t>[ORDER</a:t>
             </a:r>
             <a:r>
-              <a:rPr lang="en-US" dirty="0" smtClean="0"/>
+              <a:rPr lang="en-US" dirty="0"/>
               <a:t> </a:t>
             </a:r>
             <a:r>
@@ -6512,14 +6476,10 @@
             </a:r>
             <a:r>
               <a:rPr lang="en-US" dirty="0"/>
-              <a:t> </a:t>
-            </a:r>
-            <a:r>
-              <a:rPr lang="en-US" dirty="0" smtClean="0"/>
-              <a:t>id </a:t>
-            </a:r>
-            <a:r>
-              <a:rPr lang="en-US" b="1" dirty="0" smtClean="0"/>
+              <a:t> id </a:t>
+            </a:r>
+            <a:r>
+              <a:rPr lang="en-US" b="1" dirty="0"/>
               <a:t>ASC]</a:t>
             </a:r>
           </a:p>
@@ -6535,15 +6495,15 @@
               <a:buChar char="§"/>
             </a:pPr>
             <a:r>
-              <a:rPr lang="en-US" sz="2400" dirty="0" smtClean="0"/>
+              <a:rPr lang="en-US" sz="2400" dirty="0"/>
               <a:t>Then in </a:t>
             </a:r>
             <a:r>
-              <a:rPr lang="en-US" sz="2400" dirty="0" err="1" smtClean="0"/>
+              <a:rPr lang="en-US" sz="2400" dirty="0" err="1"/>
               <a:t>mapConnectionsToShapes</a:t>
             </a:r>
             <a:r>
-              <a:rPr lang="en-US" sz="2400" dirty="0" smtClean="0"/>
+              <a:rPr lang="en-US" sz="2400" dirty="0"/>
               <a:t>():</a:t>
             </a:r>
           </a:p>
@@ -6555,7 +6515,7 @@
               <a:buFont typeface="Wingdings" panose="05000000000000000000" pitchFamily="2" charset="2"/>
               <a:buChar char="§"/>
             </a:pPr>
-            <a:endParaRPr lang="en-US" sz="2400" dirty="0" smtClean="0"/>
+            <a:endParaRPr lang="en-US" sz="2400" dirty="0"/>
           </a:p>
           <a:p>
             <a:pPr marL="457200" indent="-457200">
@@ -6566,11 +6526,11 @@
               <a:buAutoNum type="arabicPeriod"/>
             </a:pPr>
             <a:r>
-              <a:rPr lang="en-US" b="1" dirty="0" smtClean="0"/>
+              <a:rPr lang="en-US" b="1" dirty="0"/>
               <a:t>Filter</a:t>
             </a:r>
             <a:r>
-              <a:rPr lang="en-US" dirty="0" smtClean="0"/>
+              <a:rPr lang="en-US" dirty="0"/>
               <a:t>:</a:t>
             </a:r>
           </a:p>
@@ -6583,16 +6543,8 @@
               <a:buChar char="•"/>
             </a:pPr>
             <a:r>
-              <a:rPr lang="en-US" dirty="0" smtClean="0"/>
-              <a:t>keep </a:t>
-            </a:r>
-            <a:r>
               <a:rPr lang="en-US" dirty="0"/>
-              <a:t>connections only if both target and id found in filtered </a:t>
-            </a:r>
-            <a:r>
-              <a:rPr lang="en-US" dirty="0" smtClean="0"/>
-              <a:t>vertices</a:t>
+              <a:t>keep connections only if both target and id found in filtered vertices</a:t>
             </a:r>
           </a:p>
           <a:p>
@@ -6604,11 +6556,11 @@
               <a:buAutoNum type="arabicPeriod"/>
             </a:pPr>
             <a:r>
-              <a:rPr lang="en-US" b="1" dirty="0" smtClean="0"/>
+              <a:rPr lang="en-US" b="1" dirty="0"/>
               <a:t>Simplify</a:t>
             </a:r>
             <a:r>
-              <a:rPr lang="en-US" dirty="0" smtClean="0"/>
+              <a:rPr lang="en-US" dirty="0"/>
               <a:t>:</a:t>
             </a:r>
           </a:p>
@@ -6621,12 +6573,8 @@
               <a:buChar char="•"/>
             </a:pPr>
             <a:r>
-              <a:rPr lang="en-US" dirty="0" smtClean="0"/>
-              <a:t>Clear </a:t>
-            </a:r>
-            <a:r>
               <a:rPr lang="en-US" dirty="0"/>
-              <a:t>waypoints/</a:t>
+              <a:t>Clear waypoints/</a:t>
             </a:r>
             <a:r>
               <a:rPr lang="en-US" dirty="0" err="1"/>
@@ -6647,14 +6595,10 @@
             </a:pPr>
             <a:r>
               <a:rPr lang="en-US" b="1" dirty="0"/>
-              <a:t>Map to </a:t>
-            </a:r>
-            <a:r>
-              <a:rPr lang="en-US" b="1" dirty="0" smtClean="0"/>
-              <a:t>shapes</a:t>
-            </a:r>
-            <a:r>
-              <a:rPr lang="en-US" dirty="0" smtClean="0"/>
+              <a:t>Map to shapes</a:t>
+            </a:r>
+            <a:r>
+              <a:rPr lang="en-US" dirty="0"/>
               <a:t>:</a:t>
             </a:r>
           </a:p>
@@ -6667,7 +6611,7 @@
               <a:buChar char="•"/>
             </a:pPr>
             <a:r>
-              <a:rPr lang="en-US" dirty="0" smtClean="0"/>
+              <a:rPr lang="en-US" dirty="0"/>
               <a:t>set </a:t>
             </a:r>
             <a:r>
@@ -6684,13 +6628,8 @@
             </a:r>
             <a:r>
               <a:rPr lang="en-US" dirty="0"/>
-              <a:t> shapes </a:t>
-            </a:r>
-            <a:r>
-              <a:rPr lang="en-US" dirty="0" smtClean="0"/>
-              <a:t>library</a:t>
-            </a:r>
-            <a:endParaRPr lang="en-US" dirty="0"/>
+              <a:t> shapes library</a:t>
+            </a:r>
           </a:p>
           <a:p>
             <a:endParaRPr lang="en-US" dirty="0"/>
@@ -10253,15 +10192,6 @@
                 </a:solidFill>
               </a:rPr>
               <a:t>1. Simplification of Edges</a:t>
-            </a:r>
-            <a:r>
-              <a:rPr lang="en-GB" sz="3200" b="1" dirty="0">
-                <a:solidFill>
-                  <a:srgbClr val="339966"/>
-                </a:solidFill>
-                <a:uFillTx/>
-              </a:rPr>
-              <a:t/>
             </a:r>
             <a:br>
               <a:rPr lang="en-GB" sz="3200" b="1" dirty="0">
@@ -14091,15 +14021,6 @@
                 </a:solidFill>
               </a:rPr>
               <a:t> </a:t>
-            </a:r>
-            <a:r>
-              <a:rPr lang="en-GB" sz="3200" b="1" dirty="0">
-                <a:solidFill>
-                  <a:srgbClr val="339966"/>
-                </a:solidFill>
-                <a:uFillTx/>
-              </a:rPr>
-              <a:t/>
             </a:r>
             <a:br>
               <a:rPr lang="en-GB" sz="3200" b="1" dirty="0">
@@ -19028,15 +18949,6 @@
               </a:rPr>
               <a:t>Inhaltsverzeichnis</a:t>
             </a:r>
-            <a:r>
-              <a:rPr lang="en-US" sz="3200" b="1" dirty="0">
-                <a:solidFill>
-                  <a:srgbClr val="339966"/>
-                </a:solidFill>
-                <a:uFillTx/>
-              </a:rPr>
-              <a:t/>
-            </a:r>
             <a:br>
               <a:rPr lang="en-US" sz="3200" b="1" dirty="0">
                 <a:solidFill>
@@ -19677,15 +19589,6 @@
               </a:rPr>
               <a:t>Boardlet</a:t>
             </a:r>
-            <a:r>
-              <a:rPr lang="en-US" sz="3200" b="1" dirty="0">
-                <a:solidFill>
-                  <a:srgbClr val="339966"/>
-                </a:solidFill>
-                <a:uFillTx/>
-              </a:rPr>
-              <a:t/>
-            </a:r>
             <a:br>
               <a:rPr lang="en-US" sz="3200" b="1" dirty="0">
                 <a:solidFill>
@@ -19703,7 +19606,7 @@
                 </a:solidFill>
                 <a:uFillTx/>
               </a:rPr>
-              <a:t>Weekly Sprint 14</a:t>
+              <a:t>Weekly Sprint 15</a:t>
             </a:r>
             <a:endParaRPr lang="en-US" sz="3200" dirty="0">
               <a:solidFill>
@@ -19975,15 +19878,6 @@
               </a:rPr>
               <a:t> Design</a:t>
             </a:r>
-            <a:r>
-              <a:rPr lang="en-GB" sz="3200" b="1" dirty="0">
-                <a:solidFill>
-                  <a:srgbClr val="339966"/>
-                </a:solidFill>
-                <a:uFillTx/>
-              </a:rPr>
-              <a:t/>
-            </a:r>
             <a:br>
               <a:rPr lang="en-GB" sz="3200" b="1" dirty="0">
                 <a:solidFill>
@@ -20745,15 +20639,6 @@
               </a:rPr>
               <a:t>Data Bindings</a:t>
             </a:r>
-            <a:r>
-              <a:rPr lang="en-GB" sz="3200" b="1" dirty="0">
-                <a:solidFill>
-                  <a:srgbClr val="339966"/>
-                </a:solidFill>
-                <a:uFillTx/>
-              </a:rPr>
-              <a:t/>
-            </a:r>
             <a:br>
               <a:rPr lang="en-GB" sz="3200" b="1" dirty="0">
                 <a:solidFill>
@@ -21636,21 +21521,12 @@
           <a:lstStyle/>
           <a:p>
             <a:r>
-              <a:rPr lang="en-GB" sz="3200" b="1" dirty="0" smtClean="0">
+              <a:rPr lang="en-GB" sz="3200" b="1" dirty="0">
                 <a:solidFill>
                   <a:srgbClr val="339966"/>
                 </a:solidFill>
               </a:rPr>
               <a:t>Database Queries Overview</a:t>
-            </a:r>
-            <a:r>
-              <a:rPr lang="en-GB" sz="3200" b="1" dirty="0">
-                <a:solidFill>
-                  <a:srgbClr val="339966"/>
-                </a:solidFill>
-                <a:uFillTx/>
-              </a:rPr>
-              <a:t/>
             </a:r>
             <a:br>
               <a:rPr lang="en-GB" sz="3200" b="1" dirty="0">
@@ -21716,7 +21592,7 @@
         </p:nvGrpSpPr>
         <p:grpSpPr>
           <a:xfrm>
-            <a:off x="10255077" y="1095912"/>
+            <a:off x="10255077" y="1086486"/>
             <a:ext cx="1744133" cy="2701517"/>
             <a:chOff x="9958647" y="157942"/>
             <a:chExt cx="1853738" cy="2701517"/>
@@ -24039,7 +23915,7 @@
                 <a:t>: </a:t>
               </a:r>
               <a:r>
-                <a:rPr lang="de-DE" sz="1200" dirty="0" err="1" smtClean="0"/>
+                <a:rPr lang="de-DE" sz="1200" dirty="0" err="1"/>
                 <a:t>Int</a:t>
               </a:r>
               <a:endParaRPr lang="de-DE" sz="1200" dirty="0"/>
@@ -26489,10 +26365,10 @@
         </p:nvGrpSpPr>
         <p:grpSpPr>
           <a:xfrm>
-            <a:off x="5063555" y="2843416"/>
-            <a:ext cx="1861715" cy="2671893"/>
-            <a:chOff x="3485803" y="591995"/>
-            <a:chExt cx="1861715" cy="2671893"/>
+            <a:off x="5057108" y="2843416"/>
+            <a:ext cx="1860185" cy="2671893"/>
+            <a:chOff x="3479356" y="591995"/>
+            <a:chExt cx="1860185" cy="2671893"/>
           </a:xfrm>
           <a:solidFill>
             <a:schemeClr val="accent6">
@@ -27061,7 +26937,7 @@
           </p:nvSpPr>
           <p:spPr>
             <a:xfrm>
-              <a:off x="3493780" y="3006193"/>
+              <a:off x="3479356" y="3006193"/>
               <a:ext cx="1853738" cy="257695"/>
             </a:xfrm>
             <a:prstGeom prst="rect">
@@ -27122,7 +26998,7 @@
               <a:gd name="adj1" fmla="val 50000"/>
             </a:avLst>
           </a:prstGeom>
-          <a:ln>
+          <a:ln w="76200">
             <a:tailEnd type="triangle"/>
           </a:ln>
         </p:spPr>
@@ -27228,9 +27104,9 @@
           <p:nvPr/>
         </p:nvCxnSpPr>
         <p:spPr>
-          <a:xfrm>
-            <a:off x="9389970" y="1600041"/>
-            <a:ext cx="865107" cy="7105"/>
+          <a:xfrm flipV="1">
+            <a:off x="9389970" y="1597720"/>
+            <a:ext cx="865107" cy="2321"/>
           </a:xfrm>
           <a:prstGeom prst="curvedConnector3">
             <a:avLst/>
@@ -27940,7 +27816,7 @@
         </p:nvSpPr>
         <p:spPr>
           <a:xfrm>
-            <a:off x="7785604" y="2750388"/>
+            <a:off x="7782610" y="2756103"/>
             <a:ext cx="1602968" cy="257695"/>
           </a:xfrm>
           <a:prstGeom prst="rect">
@@ -28077,19 +27953,19 @@
           </a:lstStyle>
           <a:p>
             <a:r>
-              <a:rPr lang="de-DE" sz="1200" b="1" dirty="0" err="1" smtClean="0">
+              <a:rPr lang="de-DE" sz="1200" b="1" dirty="0" err="1">
                 <a:uFillTx/>
               </a:rPr>
               <a:t>unit</a:t>
             </a:r>
             <a:r>
-              <a:rPr lang="de-DE" sz="1200" dirty="0" smtClean="0">
+              <a:rPr lang="de-DE" sz="1200" dirty="0">
                 <a:uFillTx/>
               </a:rPr>
               <a:t>: </a:t>
             </a:r>
             <a:r>
-              <a:rPr lang="de-DE" sz="1200" dirty="0" err="1" smtClean="0">
+              <a:rPr lang="de-DE" sz="1200" dirty="0" err="1">
                 <a:uFillTx/>
               </a:rPr>
               <a:t>Int</a:t>
@@ -29285,7 +29161,7 @@
         </p:nvSpPr>
         <p:spPr>
           <a:xfrm>
-            <a:off x="7786735" y="3022854"/>
+            <a:off x="7786735" y="3017139"/>
             <a:ext cx="1602968" cy="257695"/>
           </a:xfrm>
           <a:prstGeom prst="rect">
@@ -29419,20 +29295,17 @@
           </a:lstStyle>
           <a:p>
             <a:r>
-              <a:rPr lang="de-DE" sz="1200" b="1" dirty="0" smtClean="0">
+              <a:rPr lang="de-DE" sz="1200" b="1" dirty="0">
                 <a:uFillTx/>
               </a:rPr>
               <a:t>   </a:t>
             </a:r>
             <a:r>
-              <a:rPr lang="de-DE" sz="1200" dirty="0" smtClean="0">
+              <a:rPr lang="de-DE" sz="1200" dirty="0">
                 <a:uFillTx/>
               </a:rPr>
               <a:t>  …</a:t>
             </a:r>
-            <a:endParaRPr lang="de-DE" sz="1200" dirty="0">
-              <a:uFillTx/>
-            </a:endParaRPr>
           </a:p>
         </p:txBody>
       </p:sp>
@@ -29446,8 +29319,8 @@
         </p:nvSpPr>
         <p:spPr>
           <a:xfrm>
-            <a:off x="7734787" y="287377"/>
-            <a:ext cx="2373370" cy="436668"/>
+            <a:off x="7763618" y="217787"/>
+            <a:ext cx="2373370" cy="643357"/>
           </a:xfrm>
           <a:prstGeom prst="rect">
             <a:avLst/>
@@ -29583,94 +29456,172 @@
           </a:lstStyle>
           <a:p>
             <a:r>
-              <a:rPr lang="de-DE" sz="900" dirty="0" smtClean="0">
+              <a:rPr lang="de-DE" sz="900" dirty="0">
                 <a:uFillTx/>
               </a:rPr>
               <a:t>not </a:t>
             </a:r>
             <a:r>
-              <a:rPr lang="de-DE" sz="900" dirty="0" err="1" smtClean="0">
+              <a:rPr lang="de-DE" sz="900" dirty="0" err="1">
                 <a:uFillTx/>
               </a:rPr>
               <a:t>needed</a:t>
             </a:r>
             <a:r>
-              <a:rPr lang="de-DE" sz="900" dirty="0" smtClean="0">
+              <a:rPr lang="de-DE" sz="900" dirty="0">
                 <a:uFillTx/>
               </a:rPr>
               <a:t> (Legato </a:t>
             </a:r>
             <a:r>
-              <a:rPr lang="de-DE" sz="900" dirty="0" err="1" smtClean="0">
+              <a:rPr lang="de-DE" sz="900" dirty="0" err="1">
                 <a:uFillTx/>
               </a:rPr>
               <a:t>Graphic</a:t>
             </a:r>
             <a:r>
-              <a:rPr lang="de-DE" sz="900" dirty="0" smtClean="0">
+              <a:rPr lang="de-DE" sz="900" dirty="0">
                 <a:uFillTx/>
               </a:rPr>
               <a:t> Designer </a:t>
             </a:r>
             <a:r>
-              <a:rPr lang="de-DE" sz="900" dirty="0" err="1" smtClean="0">
+              <a:rPr lang="de-DE" sz="900" dirty="0" err="1">
                 <a:uFillTx/>
               </a:rPr>
               <a:t>fetches</a:t>
             </a:r>
             <a:r>
-              <a:rPr lang="de-DE" sz="900" dirty="0" smtClean="0">
+              <a:rPr lang="de-DE" sz="900" dirty="0">
                 <a:uFillTx/>
               </a:rPr>
               <a:t> </a:t>
             </a:r>
             <a:r>
-              <a:rPr lang="de-DE" sz="900" dirty="0" err="1" smtClean="0">
+              <a:rPr lang="de-DE" sz="900" dirty="0" err="1">
                 <a:uFillTx/>
               </a:rPr>
               <a:t>current_values</a:t>
             </a:r>
             <a:r>
-              <a:rPr lang="de-DE" sz="900" dirty="0" smtClean="0">
+              <a:rPr lang="de-DE" sz="900" dirty="0">
                 <a:uFillTx/>
               </a:rPr>
               <a:t> </a:t>
             </a:r>
             <a:r>
-              <a:rPr lang="de-DE" sz="900" dirty="0" err="1" smtClean="0">
+              <a:rPr lang="de-DE" sz="900" dirty="0" err="1">
                 <a:uFillTx/>
               </a:rPr>
               <a:t>automatically</a:t>
             </a:r>
             <a:r>
-              <a:rPr lang="de-DE" sz="900" dirty="0" smtClean="0">
+              <a:rPr lang="de-DE" sz="900" dirty="0">
                 <a:uFillTx/>
               </a:rPr>
               <a:t> </a:t>
             </a:r>
             <a:r>
-              <a:rPr lang="de-DE" sz="900" dirty="0" err="1" smtClean="0">
+              <a:rPr lang="de-DE" sz="900" dirty="0" err="1">
                 <a:uFillTx/>
               </a:rPr>
               <a:t>with</a:t>
             </a:r>
             <a:r>
-              <a:rPr lang="de-DE" sz="900" dirty="0" smtClean="0">
+              <a:rPr lang="de-DE" sz="900" dirty="0">
                 <a:uFillTx/>
               </a:rPr>
               <a:t> </a:t>
             </a:r>
             <a:r>
-              <a:rPr lang="de-DE" sz="900" dirty="0" err="1" smtClean="0">
+              <a:rPr lang="de-DE" sz="900" dirty="0" err="1">
                 <a:uFillTx/>
               </a:rPr>
               <a:t>the</a:t>
             </a:r>
             <a:r>
-              <a:rPr lang="de-DE" sz="900" dirty="0" smtClean="0">
-                <a:uFillTx/>
-              </a:rPr>
-              <a:t> ID)</a:t>
+              <a:rPr lang="de-DE" sz="900" dirty="0">
+                <a:uFillTx/>
+              </a:rPr>
+              <a:t> ID) and </a:t>
+            </a:r>
+            <a:r>
+              <a:rPr lang="de-DE" sz="900" dirty="0" err="1">
+                <a:uFillTx/>
+              </a:rPr>
+              <a:t>current</a:t>
+            </a:r>
+            <a:r>
+              <a:rPr lang="de-DE" sz="900" dirty="0">
+                <a:uFillTx/>
+              </a:rPr>
+              <a:t> </a:t>
+            </a:r>
+            <a:r>
+              <a:rPr lang="de-DE" sz="900" dirty="0" err="1">
+                <a:uFillTx/>
+              </a:rPr>
+              <a:t>value</a:t>
+            </a:r>
+            <a:r>
+              <a:rPr lang="de-DE" sz="900" dirty="0">
+                <a:uFillTx/>
+              </a:rPr>
+              <a:t> will </a:t>
+            </a:r>
+            <a:r>
+              <a:rPr lang="de-DE" sz="900" dirty="0" err="1">
+                <a:uFillTx/>
+              </a:rPr>
+              <a:t>be</a:t>
+            </a:r>
+            <a:r>
+              <a:rPr lang="de-DE" sz="900" dirty="0">
+                <a:uFillTx/>
+              </a:rPr>
+              <a:t> </a:t>
+            </a:r>
+            <a:r>
+              <a:rPr lang="de-DE" sz="900" dirty="0" err="1">
+                <a:uFillTx/>
+              </a:rPr>
+              <a:t>the</a:t>
+            </a:r>
+            <a:r>
+              <a:rPr lang="de-DE" sz="900" dirty="0">
+                <a:uFillTx/>
+              </a:rPr>
+              <a:t> </a:t>
+            </a:r>
+            <a:r>
+              <a:rPr lang="de-DE" sz="900" dirty="0" err="1">
+                <a:uFillTx/>
+              </a:rPr>
+              <a:t>first</a:t>
+            </a:r>
+            <a:r>
+              <a:rPr lang="de-DE" sz="900" dirty="0">
+                <a:uFillTx/>
+              </a:rPr>
+              <a:t> non-blank </a:t>
+            </a:r>
+            <a:r>
+              <a:rPr lang="de-DE" sz="900" dirty="0" err="1">
+                <a:uFillTx/>
+              </a:rPr>
+              <a:t>value</a:t>
+            </a:r>
+            <a:r>
+              <a:rPr lang="de-DE" sz="900" dirty="0">
+                <a:uFillTx/>
+              </a:rPr>
+              <a:t>_[type] </a:t>
+            </a:r>
+            <a:r>
+              <a:rPr lang="de-DE" sz="900" dirty="0" err="1">
+                <a:uFillTx/>
+              </a:rPr>
+              <a:t>field</a:t>
             </a:r>
             <a:endParaRPr lang="de-DE" sz="900" dirty="0">
               <a:uFillTx/>
@@ -29791,31 +29742,23 @@
           <a:p>
             <a:pPr algn="ctr"/>
             <a:r>
-              <a:rPr lang="de-DE" b="1" dirty="0" err="1" smtClean="0">
+              <a:rPr lang="de-DE" b="1" dirty="0" err="1">
                 <a:solidFill>
                   <a:srgbClr val="FF0000"/>
                 </a:solidFill>
               </a:rPr>
-              <a:t>visu</a:t>
-            </a:r>
-            <a:r>
-              <a:rPr lang="de-DE" b="1" dirty="0" err="1" smtClean="0">
+              <a:t>visuVertices</a:t>
+            </a:r>
+            <a:r>
+              <a:rPr lang="de-DE" b="1" dirty="0">
                 <a:solidFill>
                   <a:srgbClr val="FF0000"/>
                 </a:solidFill>
               </a:rPr>
-              <a:t>Vertices</a:t>
-            </a:r>
-            <a:r>
-              <a:rPr lang="de-DE" b="1" dirty="0" smtClean="0">
-                <a:solidFill>
-                  <a:srgbClr val="FF0000"/>
-                </a:solidFill>
-              </a:rPr>
               <a:t> </a:t>
             </a:r>
             <a:r>
-              <a:rPr lang="de-DE" b="1" dirty="0" err="1" smtClean="0">
+              <a:rPr lang="de-DE" b="1" dirty="0" err="1">
                 <a:solidFill>
                   <a:srgbClr val="FF0000"/>
                 </a:solidFill>
@@ -29858,26 +29801,18 @@
                   <a:srgbClr val="FF0000"/>
                 </a:solidFill>
               </a:rPr>
-              <a:t>l</a:t>
-            </a:r>
-            <a:r>
-              <a:rPr lang="de-DE" b="1" dirty="0" err="1" smtClean="0">
+              <a:t>lNodes</a:t>
+            </a:r>
+            <a:r>
+              <a:rPr lang="de-DE" b="1" dirty="0">
                 <a:solidFill>
                   <a:srgbClr val="FF0000"/>
                 </a:solidFill>
               </a:rPr>
-              <a:t>Nodes</a:t>
-            </a:r>
-            <a:r>
-              <a:rPr lang="de-DE" b="1" dirty="0" smtClean="0">
-                <a:solidFill>
-                  <a:srgbClr val="FF0000"/>
-                </a:solidFill>
-              </a:rPr>
               <a:t> </a:t>
             </a:r>
             <a:r>
-              <a:rPr lang="de-DE" b="1" dirty="0" err="1" smtClean="0">
+              <a:rPr lang="de-DE" b="1" dirty="0" err="1">
                 <a:solidFill>
                   <a:srgbClr val="FF0000"/>
                 </a:solidFill>
@@ -29960,7 +29895,7 @@
           <a:p>
             <a:pPr algn="ctr"/>
             <a:r>
-              <a:rPr lang="de-DE" b="1" dirty="0" err="1" smtClean="0">
+              <a:rPr lang="de-DE" b="1" dirty="0" err="1">
                 <a:solidFill>
                   <a:srgbClr val="FF0000"/>
                 </a:solidFill>
@@ -29968,7 +29903,7 @@
               <a:t>pidConnections</a:t>
             </a:r>
             <a:r>
-              <a:rPr lang="de-DE" b="1" dirty="0" smtClean="0">
+              <a:rPr lang="de-DE" b="1" dirty="0">
                 <a:solidFill>
                   <a:srgbClr val="FF0000"/>
                 </a:solidFill>
@@ -29976,7 +29911,7 @@
               <a:t> </a:t>
             </a:r>
             <a:r>
-              <a:rPr lang="de-DE" b="1" dirty="0" err="1" smtClean="0">
+              <a:rPr lang="de-DE" b="1" dirty="0" err="1">
                 <a:solidFill>
                   <a:srgbClr val="FF0000"/>
                 </a:solidFill>
@@ -30029,6 +29964,303 @@
           </a:fontRef>
         </p:style>
       </p:cxnSp>
+      <p:sp>
+        <p:nvSpPr>
+          <p:cNvPr id="110" name="Rechteck 120">
+            <a:extLst>
+              <a:ext uri="{FF2B5EF4-FFF2-40B4-BE49-F238E27FC236}">
+                <a16:creationId xmlns:a16="http://schemas.microsoft.com/office/drawing/2014/main" id="{8AC874CC-5E06-4458-9A7E-21B88CB0203E}"/>
+              </a:ext>
+            </a:extLst>
+          </p:cNvPr>
+          <p:cNvSpPr>
+            <a:spLocks/>
+          </p:cNvSpPr>
+          <p:nvPr/>
+        </p:nvSpPr>
+        <p:spPr>
+          <a:xfrm>
+            <a:off x="6939950" y="217788"/>
+            <a:ext cx="686655" cy="223620"/>
+          </a:xfrm>
+          <a:prstGeom prst="rect">
+            <a:avLst/>
+          </a:prstGeom>
+          <a:solidFill>
+            <a:schemeClr val="accent6">
+              <a:lumMod val="20000"/>
+              <a:lumOff val="80000"/>
+            </a:schemeClr>
+          </a:solidFill>
+        </p:spPr>
+        <p:style>
+          <a:lnRef idx="2">
+            <a:schemeClr val="dk1"/>
+          </a:lnRef>
+          <a:fillRef idx="1">
+            <a:schemeClr val="lt1"/>
+          </a:fillRef>
+          <a:effectRef idx="0">
+            <a:schemeClr val="dk1"/>
+          </a:effectRef>
+          <a:fontRef idx="minor">
+            <a:schemeClr val="dk1"/>
+          </a:fontRef>
+        </p:style>
+        <p:txBody>
+          <a:bodyPr rtlCol="0" anchor="t"/>
+          <a:lstStyle>
+            <a:defPPr>
+              <a:defRPr lang="de-DE">
+                <a:uFillTx/>
+              </a:defRPr>
+            </a:defPPr>
+            <a:lvl1pPr marL="0" algn="l" defTabSz="914400" rtl="0" eaLnBrk="1" latinLnBrk="0" hangingPunct="1">
+              <a:defRPr sz="1800" kern="1200">
+                <a:solidFill>
+                  <a:schemeClr val="dk1"/>
+                </a:solidFill>
+                <a:uFillTx/>
+                <a:latin typeface="+mn-lt"/>
+                <a:ea typeface="+mn-ea"/>
+                <a:cs typeface="+mn-cs"/>
+              </a:defRPr>
+            </a:lvl1pPr>
+            <a:lvl2pPr marL="457200" algn="l" defTabSz="914400" rtl="0" eaLnBrk="1" latinLnBrk="0" hangingPunct="1">
+              <a:defRPr sz="1800" kern="1200">
+                <a:solidFill>
+                  <a:schemeClr val="dk1"/>
+                </a:solidFill>
+                <a:uFillTx/>
+                <a:latin typeface="+mn-lt"/>
+                <a:ea typeface="+mn-ea"/>
+                <a:cs typeface="+mn-cs"/>
+              </a:defRPr>
+            </a:lvl2pPr>
+            <a:lvl3pPr marL="914400" algn="l" defTabSz="914400" rtl="0" eaLnBrk="1" latinLnBrk="0" hangingPunct="1">
+              <a:defRPr sz="1800" kern="1200">
+                <a:solidFill>
+                  <a:schemeClr val="dk1"/>
+                </a:solidFill>
+                <a:uFillTx/>
+                <a:latin typeface="+mn-lt"/>
+                <a:ea typeface="+mn-ea"/>
+                <a:cs typeface="+mn-cs"/>
+              </a:defRPr>
+            </a:lvl3pPr>
+            <a:lvl4pPr marL="1371600" algn="l" defTabSz="914400" rtl="0" eaLnBrk="1" latinLnBrk="0" hangingPunct="1">
+              <a:defRPr sz="1800" kern="1200">
+                <a:solidFill>
+                  <a:schemeClr val="dk1"/>
+                </a:solidFill>
+                <a:uFillTx/>
+                <a:latin typeface="+mn-lt"/>
+                <a:ea typeface="+mn-ea"/>
+                <a:cs typeface="+mn-cs"/>
+              </a:defRPr>
+            </a:lvl4pPr>
+            <a:lvl5pPr marL="1828800" algn="l" defTabSz="914400" rtl="0" eaLnBrk="1" latinLnBrk="0" hangingPunct="1">
+              <a:defRPr sz="1800" kern="1200">
+                <a:solidFill>
+                  <a:schemeClr val="dk1"/>
+                </a:solidFill>
+                <a:uFillTx/>
+                <a:latin typeface="+mn-lt"/>
+                <a:ea typeface="+mn-ea"/>
+                <a:cs typeface="+mn-cs"/>
+              </a:defRPr>
+            </a:lvl5pPr>
+            <a:lvl6pPr marL="2286000" algn="l" defTabSz="914400" rtl="0" eaLnBrk="1" latinLnBrk="0" hangingPunct="1">
+              <a:defRPr sz="1800" kern="1200">
+                <a:solidFill>
+                  <a:schemeClr val="dk1"/>
+                </a:solidFill>
+                <a:uFillTx/>
+                <a:latin typeface="+mn-lt"/>
+                <a:ea typeface="+mn-ea"/>
+                <a:cs typeface="+mn-cs"/>
+              </a:defRPr>
+            </a:lvl6pPr>
+            <a:lvl7pPr marL="2743200" algn="l" defTabSz="914400" rtl="0" eaLnBrk="1" latinLnBrk="0" hangingPunct="1">
+              <a:defRPr sz="1800" kern="1200">
+                <a:solidFill>
+                  <a:schemeClr val="dk1"/>
+                </a:solidFill>
+                <a:uFillTx/>
+                <a:latin typeface="+mn-lt"/>
+                <a:ea typeface="+mn-ea"/>
+                <a:cs typeface="+mn-cs"/>
+              </a:defRPr>
+            </a:lvl7pPr>
+            <a:lvl8pPr marL="3200400" algn="l" defTabSz="914400" rtl="0" eaLnBrk="1" latinLnBrk="0" hangingPunct="1">
+              <a:defRPr sz="1800" kern="1200">
+                <a:solidFill>
+                  <a:schemeClr val="dk1"/>
+                </a:solidFill>
+                <a:uFillTx/>
+                <a:latin typeface="+mn-lt"/>
+                <a:ea typeface="+mn-ea"/>
+                <a:cs typeface="+mn-cs"/>
+              </a:defRPr>
+            </a:lvl8pPr>
+            <a:lvl9pPr marL="3657600" algn="l" defTabSz="914400" rtl="0" eaLnBrk="1" latinLnBrk="0" hangingPunct="1">
+              <a:defRPr sz="1800" kern="1200">
+                <a:solidFill>
+                  <a:schemeClr val="dk1"/>
+                </a:solidFill>
+                <a:uFillTx/>
+                <a:latin typeface="+mn-lt"/>
+                <a:ea typeface="+mn-ea"/>
+                <a:cs typeface="+mn-cs"/>
+              </a:defRPr>
+            </a:lvl9pPr>
+          </a:lstStyle>
+          <a:p>
+            <a:r>
+              <a:rPr lang="de-DE" sz="900" dirty="0" err="1">
+                <a:uFillTx/>
+              </a:rPr>
+              <a:t>fetched</a:t>
+            </a:r>
+            <a:endParaRPr lang="de-DE" sz="900" dirty="0">
+              <a:uFillTx/>
+            </a:endParaRPr>
+          </a:p>
+        </p:txBody>
+      </p:sp>
+      <p:sp>
+        <p:nvSpPr>
+          <p:cNvPr id="111" name="Textfeld 9">
+            <a:extLst>
+              <a:ext uri="{FF2B5EF4-FFF2-40B4-BE49-F238E27FC236}">
+                <a16:creationId xmlns:a16="http://schemas.microsoft.com/office/drawing/2014/main" id="{A955CEEB-AB5A-447C-832F-E652EF4B5874}"/>
+              </a:ext>
+            </a:extLst>
+          </p:cNvPr>
+          <p:cNvSpPr txBox="1"/>
+          <p:nvPr/>
+        </p:nvSpPr>
+        <p:spPr>
+          <a:xfrm>
+            <a:off x="7261741" y="4053930"/>
+            <a:ext cx="1047548" cy="1384995"/>
+          </a:xfrm>
+          <a:prstGeom prst="rect">
+            <a:avLst/>
+          </a:prstGeom>
+        </p:spPr>
+        <p:txBody>
+          <a:bodyPr wrap="square" rtlCol="0">
+            <a:spAutoFit/>
+          </a:bodyPr>
+          <a:lstStyle/>
+          <a:p>
+            <a:r>
+              <a:rPr lang="de-DE" sz="1400" b="1" dirty="0">
+                <a:solidFill>
+                  <a:srgbClr val="FF0000"/>
+                </a:solidFill>
+              </a:rPr>
+              <a:t>TODO</a:t>
+            </a:r>
+          </a:p>
+          <a:p>
+            <a:r>
+              <a:rPr lang="de-DE" sz="1400" b="1" dirty="0" err="1">
+                <a:solidFill>
+                  <a:srgbClr val="FF0000"/>
+                </a:solidFill>
+              </a:rPr>
+              <a:t>Complex</a:t>
+            </a:r>
+            <a:r>
+              <a:rPr lang="de-DE" sz="1400" b="1" dirty="0">
+                <a:solidFill>
+                  <a:srgbClr val="FF0000"/>
+                </a:solidFill>
+              </a:rPr>
+              <a:t> </a:t>
+            </a:r>
+            <a:r>
+              <a:rPr lang="de-DE" sz="1400" b="1" dirty="0" err="1">
+                <a:solidFill>
+                  <a:srgbClr val="FF0000"/>
+                </a:solidFill>
+              </a:rPr>
+              <a:t>query</a:t>
+            </a:r>
+            <a:r>
+              <a:rPr lang="de-DE" sz="1400" b="1" dirty="0">
+                <a:solidFill>
+                  <a:srgbClr val="FF0000"/>
+                </a:solidFill>
+              </a:rPr>
+              <a:t> </a:t>
+            </a:r>
+            <a:r>
+              <a:rPr lang="de-DE" sz="1400" b="1" dirty="0" err="1">
+                <a:solidFill>
+                  <a:srgbClr val="FF0000"/>
+                </a:solidFill>
+              </a:rPr>
+              <a:t>to</a:t>
+            </a:r>
+            <a:r>
+              <a:rPr lang="de-DE" sz="1400" b="1" dirty="0">
+                <a:solidFill>
+                  <a:srgbClr val="FF0000"/>
+                </a:solidFill>
+              </a:rPr>
+              <a:t> also </a:t>
+            </a:r>
+            <a:r>
+              <a:rPr lang="de-DE" sz="1400" b="1" dirty="0" err="1">
+                <a:solidFill>
+                  <a:srgbClr val="FF0000"/>
+                </a:solidFill>
+              </a:rPr>
+              <a:t>get</a:t>
+            </a:r>
+            <a:r>
+              <a:rPr lang="de-DE" sz="1400" b="1" dirty="0">
+                <a:solidFill>
+                  <a:srgbClr val="FF0000"/>
+                </a:solidFill>
+              </a:rPr>
+              <a:t> </a:t>
+            </a:r>
+            <a:r>
+              <a:rPr lang="de-DE" sz="1400" b="1" dirty="0" err="1">
+                <a:solidFill>
+                  <a:srgbClr val="FF0000"/>
+                </a:solidFill>
+              </a:rPr>
+              <a:t>this</a:t>
+            </a:r>
+            <a:r>
+              <a:rPr lang="de-DE" sz="1400" b="1" dirty="0">
+                <a:solidFill>
+                  <a:srgbClr val="FF0000"/>
+                </a:solidFill>
+              </a:rPr>
+              <a:t> </a:t>
+            </a:r>
+            <a:r>
+              <a:rPr lang="de-DE" sz="1400" b="1" dirty="0" err="1">
+                <a:solidFill>
+                  <a:srgbClr val="FF0000"/>
+                </a:solidFill>
+              </a:rPr>
+              <a:t>together</a:t>
+            </a:r>
+            <a:endParaRPr lang="de-DE" sz="1400" b="1" dirty="0">
+              <a:solidFill>
+                <a:srgbClr val="FF0000"/>
+              </a:solidFill>
+            </a:endParaRPr>
+          </a:p>
+        </p:txBody>
+      </p:sp>
     </p:spTree>
     <p:extLst>
       <p:ext uri="{BB962C8B-B14F-4D97-AF65-F5344CB8AC3E}">
@@ -30082,7 +30314,7 @@
           <a:lstStyle/>
           <a:p>
             <a:r>
-              <a:rPr lang="en-GB" sz="3200" b="1" dirty="0" err="1" smtClean="0">
+              <a:rPr lang="en-GB" sz="3200" b="1" dirty="0" err="1">
                 <a:solidFill>
                   <a:srgbClr val="339966"/>
                 </a:solidFill>
@@ -30091,7 +30323,7 @@
               <a:t>lNodes</a:t>
             </a:r>
             <a:r>
-              <a:rPr lang="en-GB" sz="3200" b="1" dirty="0" smtClean="0">
+              <a:rPr lang="en-GB" sz="3200" b="1" dirty="0">
                 <a:solidFill>
                   <a:srgbClr val="339966"/>
                 </a:solidFill>
@@ -30100,22 +30332,13 @@
               <a:t> and </a:t>
             </a:r>
             <a:r>
-              <a:rPr lang="en-GB" sz="3200" b="1" dirty="0" err="1" smtClean="0">
+              <a:rPr lang="en-GB" sz="3200" b="1" dirty="0" err="1">
                 <a:solidFill>
                   <a:srgbClr val="339966"/>
                 </a:solidFill>
                 <a:uFillTx/>
               </a:rPr>
               <a:t>dataBindings</a:t>
-            </a:r>
-            <a:r>
-              <a:rPr lang="en-GB" sz="3200" b="1" dirty="0">
-                <a:solidFill>
-                  <a:srgbClr val="339966"/>
-                </a:solidFill>
-                <a:uFillTx/>
-              </a:rPr>
-              <a:t/>
             </a:r>
             <a:br>
               <a:rPr lang="en-GB" sz="3200" b="1" dirty="0">
@@ -30126,7 +30349,7 @@
               </a:rPr>
             </a:br>
             <a:r>
-              <a:rPr lang="en-GB" sz="1600" b="1" dirty="0" smtClean="0">
+              <a:rPr lang="en-GB" sz="1600" b="1" dirty="0">
                 <a:solidFill>
                   <a:schemeClr val="bg1">
                     <a:lumMod val="50000"/>
@@ -35325,19 +35548,19 @@
           </a:lstStyle>
           <a:p>
             <a:r>
-              <a:rPr lang="de-DE" sz="1200" b="1" dirty="0" err="1" smtClean="0">
+              <a:rPr lang="de-DE" sz="1200" b="1" dirty="0" err="1">
                 <a:uFillTx/>
               </a:rPr>
               <a:t>unit</a:t>
             </a:r>
             <a:r>
-              <a:rPr lang="de-DE" sz="1200" dirty="0" smtClean="0">
+              <a:rPr lang="de-DE" sz="1200" dirty="0">
                 <a:uFillTx/>
               </a:rPr>
               <a:t>: </a:t>
             </a:r>
             <a:r>
-              <a:rPr lang="de-DE" sz="1200" dirty="0" err="1" smtClean="0">
+              <a:rPr lang="de-DE" sz="1200" dirty="0" err="1">
                 <a:uFillTx/>
               </a:rPr>
               <a:t>Int</a:t>
@@ -36664,20 +36887,17 @@
           </a:lstStyle>
           <a:p>
             <a:r>
-              <a:rPr lang="de-DE" sz="1200" b="1" dirty="0" smtClean="0">
+              <a:rPr lang="de-DE" sz="1200" b="1" dirty="0">
                 <a:uFillTx/>
               </a:rPr>
               <a:t>   </a:t>
             </a:r>
             <a:r>
-              <a:rPr lang="de-DE" sz="1200" dirty="0" smtClean="0">
+              <a:rPr lang="de-DE" sz="1200" dirty="0">
                 <a:uFillTx/>
               </a:rPr>
               <a:t>  …</a:t>
             </a:r>
-            <a:endParaRPr lang="de-DE" sz="1200" dirty="0">
-              <a:uFillTx/>
-            </a:endParaRPr>
           </a:p>
         </p:txBody>
       </p:sp>
@@ -36828,98 +37048,95 @@
           </a:lstStyle>
           <a:p>
             <a:r>
-              <a:rPr lang="de-DE" sz="900" dirty="0" smtClean="0">
+              <a:rPr lang="de-DE" sz="900" dirty="0">
                 <a:uFillTx/>
               </a:rPr>
               <a:t>not </a:t>
             </a:r>
             <a:r>
-              <a:rPr lang="de-DE" sz="900" dirty="0" err="1" smtClean="0">
+              <a:rPr lang="de-DE" sz="900" dirty="0" err="1">
                 <a:uFillTx/>
               </a:rPr>
               <a:t>needed</a:t>
             </a:r>
             <a:r>
-              <a:rPr lang="de-DE" sz="900" dirty="0" smtClean="0">
+              <a:rPr lang="de-DE" sz="900" dirty="0">
                 <a:uFillTx/>
               </a:rPr>
               <a:t> (Legato </a:t>
             </a:r>
             <a:r>
-              <a:rPr lang="de-DE" sz="900" dirty="0" err="1" smtClean="0">
+              <a:rPr lang="de-DE" sz="900" dirty="0" err="1">
                 <a:uFillTx/>
               </a:rPr>
               <a:t>Graphic</a:t>
             </a:r>
             <a:r>
-              <a:rPr lang="de-DE" sz="900" dirty="0" smtClean="0">
+              <a:rPr lang="de-DE" sz="900" dirty="0">
                 <a:uFillTx/>
               </a:rPr>
               <a:t> Designer </a:t>
             </a:r>
             <a:r>
-              <a:rPr lang="de-DE" sz="900" dirty="0" err="1" smtClean="0">
+              <a:rPr lang="de-DE" sz="900" dirty="0" err="1">
                 <a:uFillTx/>
               </a:rPr>
               <a:t>fetches</a:t>
             </a:r>
             <a:r>
-              <a:rPr lang="de-DE" sz="900" dirty="0" smtClean="0">
+              <a:rPr lang="de-DE" sz="900" dirty="0">
                 <a:uFillTx/>
               </a:rPr>
               <a:t> </a:t>
             </a:r>
             <a:r>
-              <a:rPr lang="de-DE" sz="900" dirty="0" err="1" smtClean="0">
+              <a:rPr lang="de-DE" sz="900" dirty="0" err="1">
                 <a:uFillTx/>
               </a:rPr>
               <a:t>current_values</a:t>
             </a:r>
             <a:r>
-              <a:rPr lang="de-DE" sz="900" dirty="0" smtClean="0">
+              <a:rPr lang="de-DE" sz="900" dirty="0">
                 <a:uFillTx/>
               </a:rPr>
               <a:t> </a:t>
             </a:r>
             <a:r>
-              <a:rPr lang="de-DE" sz="900" dirty="0" err="1" smtClean="0">
+              <a:rPr lang="de-DE" sz="900" dirty="0" err="1">
                 <a:uFillTx/>
               </a:rPr>
               <a:t>automatically</a:t>
             </a:r>
             <a:r>
-              <a:rPr lang="de-DE" sz="900" dirty="0" smtClean="0">
+              <a:rPr lang="de-DE" sz="900" dirty="0">
                 <a:uFillTx/>
               </a:rPr>
               <a:t> </a:t>
             </a:r>
             <a:r>
-              <a:rPr lang="de-DE" sz="900" dirty="0" err="1" smtClean="0">
+              <a:rPr lang="de-DE" sz="900" dirty="0" err="1">
                 <a:uFillTx/>
               </a:rPr>
               <a:t>with</a:t>
             </a:r>
             <a:r>
-              <a:rPr lang="de-DE" sz="900" dirty="0" smtClean="0">
+              <a:rPr lang="de-DE" sz="900" dirty="0">
                 <a:uFillTx/>
               </a:rPr>
               <a:t> </a:t>
             </a:r>
             <a:r>
-              <a:rPr lang="de-DE" sz="900" dirty="0" err="1" smtClean="0">
+              <a:rPr lang="de-DE" sz="900" dirty="0" err="1">
                 <a:uFillTx/>
               </a:rPr>
               <a:t>the</a:t>
             </a:r>
             <a:r>
-              <a:rPr lang="de-DE" sz="900" dirty="0" smtClean="0">
+              <a:rPr lang="de-DE" sz="900" dirty="0">
                 <a:uFillTx/>
               </a:rPr>
               <a:t> ID)</a:t>
             </a:r>
-            <a:endParaRPr lang="de-DE" sz="900" dirty="0">
-              <a:uFillTx/>
-            </a:endParaRPr>
           </a:p>
         </p:txBody>
       </p:sp>
@@ -36996,26 +37213,18 @@
                   <a:srgbClr val="FF0000"/>
                 </a:solidFill>
               </a:rPr>
-              <a:t>l</a:t>
-            </a:r>
-            <a:r>
-              <a:rPr lang="de-DE" b="1" dirty="0" err="1" smtClean="0">
+              <a:t>lNodes</a:t>
+            </a:r>
+            <a:r>
+              <a:rPr lang="de-DE" b="1" dirty="0">
                 <a:solidFill>
                   <a:srgbClr val="FF0000"/>
                 </a:solidFill>
               </a:rPr>
-              <a:t>Nodes</a:t>
-            </a:r>
-            <a:r>
-              <a:rPr lang="de-DE" b="1" dirty="0" smtClean="0">
-                <a:solidFill>
-                  <a:srgbClr val="FF0000"/>
-                </a:solidFill>
-              </a:rPr>
               <a:t> </a:t>
             </a:r>
             <a:r>
-              <a:rPr lang="de-DE" b="1" dirty="0" err="1" smtClean="0">
+              <a:rPr lang="de-DE" b="1" dirty="0" err="1">
                 <a:solidFill>
                   <a:srgbClr val="FF0000"/>
                 </a:solidFill>
@@ -37105,14 +37314,6 @@
                 </a:solidFill>
               </a:rPr>
               <a:t>dataBindings</a:t>
-            </a:r>
-            <a:r>
-              <a:rPr lang="en-GB" sz="3200" b="1" dirty="0">
-                <a:solidFill>
-                  <a:srgbClr val="339966"/>
-                </a:solidFill>
-              </a:rPr>
-              <a:t/>
             </a:r>
             <a:br>
               <a:rPr lang="en-GB" sz="3200" b="1" dirty="0">
@@ -37409,12 +37610,8 @@
               <a:t> </a:t>
             </a:r>
             <a:r>
-              <a:rPr lang="en-US" sz="2400" dirty="0" smtClean="0"/>
-              <a:t>Query </a:t>
-            </a:r>
-            <a:r>
               <a:rPr lang="en-US" sz="2400" dirty="0"/>
-              <a:t>data for data bindings and animations along with </a:t>
+              <a:t>Query data for data bindings and animations along with </a:t>
             </a:r>
             <a:r>
               <a:rPr lang="en-US" sz="2400" dirty="0" err="1"/>
@@ -37424,55 +37621,26 @@
               <a:rPr lang="en-US" sz="2400" dirty="0"/>
               <a:t>:</a:t>
             </a:r>
-            <a:endParaRPr lang="en-US" sz="2400" dirty="0"/>
-          </a:p>
-          <a:p>
-            <a:endParaRPr lang="en-US" b="1" dirty="0" smtClean="0"/>
           </a:p>
           <a:p>
             <a:endParaRPr lang="en-US" b="1" dirty="0"/>
           </a:p>
           <a:p>
+            <a:endParaRPr lang="en-US" b="1" dirty="0"/>
+          </a:p>
+          <a:p>
             <a:pPr lvl="2"/>
             <a:r>
-              <a:rPr lang="en-US" b="1" dirty="0" smtClean="0"/>
+              <a:rPr lang="en-US" b="1" dirty="0"/>
               <a:t>SELECT</a:t>
             </a:r>
             <a:r>
-              <a:rPr lang="en-US" dirty="0" smtClean="0"/>
+              <a:rPr lang="en-US" dirty="0"/>
               <a:t> n.id, </a:t>
             </a:r>
             <a:r>
-              <a:rPr lang="en-US" dirty="0" err="1" smtClean="0"/>
+              <a:rPr lang="en-US" dirty="0" err="1"/>
               <a:t>n.node_level</a:t>
-            </a:r>
-            <a:r>
-              <a:rPr lang="en-US" dirty="0" smtClean="0"/>
-              <a:t>, </a:t>
-            </a:r>
-            <a:r>
-              <a:rPr lang="en-US" dirty="0" err="1" smtClean="0"/>
-              <a:t>n.parent</a:t>
-            </a:r>
-            <a:r>
-              <a:rPr lang="en-US" dirty="0" smtClean="0"/>
-              <a:t>, </a:t>
-            </a:r>
-            <a:r>
-              <a:rPr lang="en-US" dirty="0" err="1" smtClean="0"/>
-              <a:t>n.short_name</a:t>
-            </a:r>
-            <a:r>
-              <a:rPr lang="en-US" dirty="0" smtClean="0"/>
-              <a:t>, n.name_0, </a:t>
-            </a:r>
-            <a:r>
-              <a:rPr lang="en-US" dirty="0" err="1" smtClean="0"/>
-              <a:t>n.attr_jsonb</a:t>
-            </a:r>
-            <a:r>
-              <a:rPr lang="en-US" dirty="0" smtClean="0"/>
-              <a:t>, r.id</a:t>
             </a:r>
             <a:r>
               <a:rPr lang="en-US" dirty="0"/>
@@ -37480,7 +37648,7 @@
             </a:r>
             <a:r>
               <a:rPr lang="en-US" dirty="0" err="1"/>
-              <a:t>r.node</a:t>
+              <a:t>n.parent</a:t>
             </a:r>
             <a:r>
               <a:rPr lang="en-US" dirty="0"/>
@@ -37488,6 +37656,30 @@
             </a:r>
             <a:r>
               <a:rPr lang="en-US" dirty="0" err="1"/>
+              <a:t>n.short_name</a:t>
+            </a:r>
+            <a:r>
+              <a:rPr lang="en-US" dirty="0"/>
+              <a:t>, n.name_0, </a:t>
+            </a:r>
+            <a:r>
+              <a:rPr lang="en-US" dirty="0" err="1"/>
+              <a:t>n.attr_jsonb</a:t>
+            </a:r>
+            <a:r>
+              <a:rPr lang="en-US" dirty="0"/>
+              <a:t>, r.id, </a:t>
+            </a:r>
+            <a:r>
+              <a:rPr lang="en-US" dirty="0" err="1"/>
+              <a:t>r.node</a:t>
+            </a:r>
+            <a:r>
+              <a:rPr lang="en-US" dirty="0"/>
+              <a:t>, </a:t>
+            </a:r>
+            <a:r>
+              <a:rPr lang="en-US" dirty="0" err="1"/>
               <a:t>r.value</a:t>
             </a:r>
             <a:r>
@@ -37656,11 +37848,11 @@
           <a:p>
             <a:pPr lvl="2"/>
             <a:r>
-              <a:rPr lang="en-US" b="1" dirty="0" smtClean="0"/>
+              <a:rPr lang="en-US" b="1" dirty="0"/>
               <a:t>LEFT JOIN</a:t>
             </a:r>
             <a:r>
-              <a:rPr lang="en-US" dirty="0" smtClean="0"/>
+              <a:rPr lang="en-US" dirty="0"/>
               <a:t> </a:t>
             </a:r>
             <a:r>
@@ -37737,7 +37929,6 @@
               <a:rPr lang="en-US" b="1" dirty="0"/>
               <a:t>ASC]</a:t>
             </a:r>
-            <a:endParaRPr lang="en-US" b="1" dirty="0"/>
           </a:p>
         </p:txBody>
       </p:sp>
@@ -37794,20 +37985,12 @@
           <a:lstStyle/>
           <a:p>
             <a:r>
-              <a:rPr lang="en-US" sz="3200" b="1" dirty="0" err="1" smtClean="0">
+              <a:rPr lang="en-US" sz="3200" b="1" dirty="0" err="1">
                 <a:solidFill>
                   <a:srgbClr val="339966"/>
                 </a:solidFill>
               </a:rPr>
               <a:t>visuVertices</a:t>
-            </a:r>
-            <a:r>
-              <a:rPr lang="en-US" sz="3200" b="1" dirty="0">
-                <a:solidFill>
-                  <a:srgbClr val="339966"/>
-                </a:solidFill>
-              </a:rPr>
-              <a:t/>
             </a:r>
             <a:br>
               <a:rPr lang="en-US" sz="3200" b="1" dirty="0">
@@ -39511,31 +39694,23 @@
           <a:p>
             <a:pPr algn="ctr"/>
             <a:r>
-              <a:rPr lang="de-DE" b="1" dirty="0" err="1" smtClean="0">
+              <a:rPr lang="de-DE" b="1" dirty="0" err="1">
                 <a:solidFill>
                   <a:srgbClr val="FF0000"/>
                 </a:solidFill>
               </a:rPr>
-              <a:t>visu</a:t>
-            </a:r>
-            <a:r>
-              <a:rPr lang="de-DE" b="1" dirty="0" err="1" smtClean="0">
+              <a:t>visuVertices</a:t>
+            </a:r>
+            <a:r>
+              <a:rPr lang="de-DE" b="1" dirty="0">
                 <a:solidFill>
                   <a:srgbClr val="FF0000"/>
                 </a:solidFill>
               </a:rPr>
-              <a:t>Vertices</a:t>
-            </a:r>
-            <a:r>
-              <a:rPr lang="de-DE" b="1" dirty="0" smtClean="0">
-                <a:solidFill>
-                  <a:srgbClr val="FF0000"/>
-                </a:solidFill>
-              </a:rPr>
               <a:t> </a:t>
             </a:r>
             <a:r>
-              <a:rPr lang="de-DE" b="1" dirty="0" err="1" smtClean="0">
+              <a:rPr lang="de-DE" b="1" dirty="0" err="1">
                 <a:solidFill>
                   <a:srgbClr val="FF0000"/>
                 </a:solidFill>

</xml_diff>